<commit_message>
Updated GPU slides in Will_Additions.
</commit_message>
<xml_diff>
--- a/Final Research Presentation/Will_Additions.pptx
+++ b/Final Research Presentation/Will_Additions.pptx
@@ -194,7 +194,7 @@
             <a:fld id="{D454FE15-F6B3-874B-B378-F652C1F4788C}" type="datetimeFigureOut">
               <a:rPr lang="en-US" smtClean="0"/>
               <a:pPr/>
-              <a:t>8/14/2012</a:t>
+              <a:t>8/15/2012</a:t>
             </a:fld>
             <a:endParaRPr lang="en-US"/>
           </a:p>
@@ -591,7 +591,7 @@
             <a:fld id="{4BDB84C0-9A3A-884B-883E-F7760F12E0B8}" type="datetimeFigureOut">
               <a:rPr lang="en-US" smtClean="0"/>
               <a:pPr/>
-              <a:t>8/14/2012</a:t>
+              <a:t>8/15/2012</a:t>
             </a:fld>
             <a:endParaRPr lang="en-US"/>
           </a:p>
@@ -892,7 +892,7 @@
             <a:fld id="{4BDB84C0-9A3A-884B-883E-F7760F12E0B8}" type="datetimeFigureOut">
               <a:rPr lang="en-US" smtClean="0"/>
               <a:pPr/>
-              <a:t>8/14/2012</a:t>
+              <a:t>8/15/2012</a:t>
             </a:fld>
             <a:endParaRPr lang="en-US"/>
           </a:p>
@@ -1069,7 +1069,7 @@
             <a:fld id="{4BDB84C0-9A3A-884B-883E-F7760F12E0B8}" type="datetimeFigureOut">
               <a:rPr lang="en-US" smtClean="0"/>
               <a:pPr/>
-              <a:t>8/14/2012</a:t>
+              <a:t>8/15/2012</a:t>
             </a:fld>
             <a:endParaRPr lang="en-US"/>
           </a:p>
@@ -1236,7 +1236,7 @@
             <a:fld id="{4BDB84C0-9A3A-884B-883E-F7760F12E0B8}" type="datetimeFigureOut">
               <a:rPr lang="en-US" smtClean="0"/>
               <a:pPr/>
-              <a:t>8/14/2012</a:t>
+              <a:t>8/15/2012</a:t>
             </a:fld>
             <a:endParaRPr lang="en-US"/>
           </a:p>
@@ -1496,7 +1496,7 @@
             <a:fld id="{4BDB84C0-9A3A-884B-883E-F7760F12E0B8}" type="datetimeFigureOut">
               <a:rPr lang="en-US" smtClean="0"/>
               <a:pPr/>
-              <a:t>8/14/2012</a:t>
+              <a:t>8/15/2012</a:t>
             </a:fld>
             <a:endParaRPr lang="en-US"/>
           </a:p>
@@ -1950,7 +1950,7 @@
             <a:fld id="{4BDB84C0-9A3A-884B-883E-F7760F12E0B8}" type="datetimeFigureOut">
               <a:rPr lang="en-US" smtClean="0"/>
               <a:pPr/>
-              <a:t>8/14/2012</a:t>
+              <a:t>8/15/2012</a:t>
             </a:fld>
             <a:endParaRPr lang="en-US"/>
           </a:p>
@@ -2430,7 +2430,7 @@
             <a:fld id="{4BDB84C0-9A3A-884B-883E-F7760F12E0B8}" type="datetimeFigureOut">
               <a:rPr lang="en-US" smtClean="0"/>
               <a:pPr/>
-              <a:t>8/14/2012</a:t>
+              <a:t>8/15/2012</a:t>
             </a:fld>
             <a:endParaRPr lang="en-US"/>
           </a:p>
@@ -2550,7 +2550,7 @@
             <a:fld id="{4BDB84C0-9A3A-884B-883E-F7760F12E0B8}" type="datetimeFigureOut">
               <a:rPr lang="en-US" smtClean="0"/>
               <a:pPr/>
-              <a:t>8/14/2012</a:t>
+              <a:t>8/15/2012</a:t>
             </a:fld>
             <a:endParaRPr lang="en-US"/>
           </a:p>
@@ -2688,7 +2688,7 @@
             <a:fld id="{4BDB84C0-9A3A-884B-883E-F7760F12E0B8}" type="datetimeFigureOut">
               <a:rPr lang="en-US" smtClean="0"/>
               <a:pPr/>
-              <a:t>8/14/2012</a:t>
+              <a:t>8/15/2012</a:t>
             </a:fld>
             <a:endParaRPr lang="en-US"/>
           </a:p>
@@ -3001,7 +3001,7 @@
             <a:fld id="{4BDB84C0-9A3A-884B-883E-F7760F12E0B8}" type="datetimeFigureOut">
               <a:rPr lang="en-US" smtClean="0"/>
               <a:pPr/>
-              <a:t>8/14/2012</a:t>
+              <a:t>8/15/2012</a:t>
             </a:fld>
             <a:endParaRPr lang="en-US"/>
           </a:p>
@@ -3130,7 +3130,7 @@
             <a:fld id="{4BDB84C0-9A3A-884B-883E-F7760F12E0B8}" type="datetimeFigureOut">
               <a:rPr lang="en-US" smtClean="0"/>
               <a:pPr/>
-              <a:t>8/14/2012</a:t>
+              <a:t>8/15/2012</a:t>
             </a:fld>
             <a:endParaRPr lang="en-US"/>
           </a:p>
@@ -3888,7 +3888,7 @@
             <a:fld id="{4BDB84C0-9A3A-884B-883E-F7760F12E0B8}" type="datetimeFigureOut">
               <a:rPr lang="en-US" smtClean="0"/>
               <a:pPr/>
-              <a:t>8/14/2012</a:t>
+              <a:t>8/15/2012</a:t>
             </a:fld>
             <a:endParaRPr lang="en-US"/>
           </a:p>
@@ -4449,7 +4449,7 @@
         </p:spPr>
         <p:txBody>
           <a:bodyPr>
-            <a:normAutofit fontScale="85000" lnSpcReduction="20000"/>
+            <a:normAutofit fontScale="85000" lnSpcReduction="10000"/>
           </a:bodyPr>
           <a:lstStyle/>
           <a:p>
@@ -4601,7 +4601,41 @@
                 <a:ea typeface="+mn-ea"/>
                 <a:cs typeface="+mn-cs"/>
               </a:rPr>
-              <a:t>Cores on the same card have shared global memory</a:t>
+              <a:t>Cores share</a:t>
+            </a:r>
+            <a:r>
+              <a:rPr kumimoji="0" lang="en-US" sz="2800" b="0" i="0" u="none" strike="noStrike" kern="1200" cap="none" spc="0" normalizeH="0" noProof="0" dirty="0" smtClean="0">
+                <a:ln>
+                  <a:noFill/>
+                </a:ln>
+                <a:solidFill>
+                  <a:schemeClr val="tx1"/>
+                </a:solidFill>
+                <a:effectLst/>
+                <a:uLnTx/>
+                <a:uFillTx/>
+                <a:latin typeface="+mn-lt"/>
+                <a:ea typeface="+mn-ea"/>
+                <a:cs typeface="+mn-cs"/>
+              </a:rPr>
+              <a:t> </a:t>
+            </a:r>
+            <a:r>
+              <a:rPr kumimoji="0" lang="en-US" sz="2800" b="0" i="0" u="none" strike="noStrike" kern="1200" cap="none" spc="0" normalizeH="0" baseline="0" noProof="0" dirty="0" smtClean="0">
+                <a:ln>
+                  <a:noFill/>
+                </a:ln>
+                <a:solidFill>
+                  <a:schemeClr val="tx1"/>
+                </a:solidFill>
+                <a:effectLst/>
+                <a:uLnTx/>
+                <a:uFillTx/>
+                <a:latin typeface="+mn-lt"/>
+                <a:ea typeface="+mn-ea"/>
+                <a:cs typeface="+mn-cs"/>
+              </a:rPr>
+              <a:t>global memory</a:t>
             </a:r>
           </a:p>
           <a:p>
@@ -4625,56 +4659,31 @@
               <a:defRPr/>
             </a:pPr>
             <a:r>
-              <a:rPr kumimoji="0" lang="en-US" sz="2800" b="0" i="0" u="none" strike="noStrike" kern="1200" cap="none" spc="0" normalizeH="0" baseline="0" noProof="0" dirty="0" smtClean="0">
-                <a:ln>
-                  <a:noFill/>
-                </a:ln>
-                <a:solidFill>
-                  <a:schemeClr val="tx1"/>
-                </a:solidFill>
-                <a:effectLst/>
-                <a:uLnTx/>
-                <a:uFillTx/>
-                <a:latin typeface="+mn-lt"/>
-                <a:ea typeface="+mn-ea"/>
-                <a:cs typeface="+mn-cs"/>
-              </a:rPr>
-              <a:t>Warp/</a:t>
-            </a:r>
-            <a:r>
-              <a:rPr kumimoji="0" lang="en-US" sz="2800" b="0" i="0" u="none" strike="noStrike" kern="1200" cap="none" spc="0" normalizeH="0" baseline="0" noProof="0" dirty="0" err="1" smtClean="0">
-                <a:ln>
-                  <a:noFill/>
-                </a:ln>
-                <a:solidFill>
-                  <a:schemeClr val="tx1"/>
-                </a:solidFill>
-                <a:effectLst/>
-                <a:uLnTx/>
-                <a:uFillTx/>
-                <a:latin typeface="+mn-lt"/>
-                <a:ea typeface="+mn-ea"/>
-                <a:cs typeface="+mn-cs"/>
-              </a:rPr>
-              <a:t>Wavefront</a:t>
-            </a:r>
-            <a:r>
-              <a:rPr kumimoji="0" lang="en-US" sz="2800" b="0" i="0" u="none" strike="noStrike" kern="1200" cap="none" spc="0" normalizeH="0" baseline="0" noProof="0" dirty="0" smtClean="0">
-                <a:ln>
-                  <a:noFill/>
-                </a:ln>
-                <a:solidFill>
-                  <a:schemeClr val="tx1"/>
-                </a:solidFill>
-                <a:effectLst/>
-                <a:uLnTx/>
-                <a:uFillTx/>
-                <a:latin typeface="+mn-lt"/>
-                <a:ea typeface="+mn-ea"/>
-                <a:cs typeface="+mn-cs"/>
-              </a:rPr>
-              <a:t>- Similar to vector processor except much larger (SIMD)</a:t>
-            </a:r>
+              <a:rPr lang="en-US" noProof="0" dirty="0" smtClean="0"/>
+              <a:t>Warps/</a:t>
+            </a:r>
+            <a:r>
+              <a:rPr lang="en-US" noProof="0" dirty="0" err="1" smtClean="0"/>
+              <a:t>Wavefronts</a:t>
+            </a:r>
+            <a:r>
+              <a:rPr lang="en-US" noProof="0" dirty="0" smtClean="0"/>
+              <a:t> – groups of cores run same code. </a:t>
+            </a:r>
+            <a:endParaRPr kumimoji="0" lang="en-US" sz="2800" b="0" i="0" u="none" strike="noStrike" kern="1200" cap="none" spc="0" normalizeH="0" baseline="0" noProof="0" dirty="0" smtClean="0">
+              <a:ln>
+                <a:noFill/>
+              </a:ln>
+              <a:solidFill>
+                <a:schemeClr val="tx1"/>
+              </a:solidFill>
+              <a:effectLst/>
+              <a:uLnTx/>
+              <a:uFillTx/>
+              <a:latin typeface="+mn-lt"/>
+              <a:ea typeface="+mn-ea"/>
+              <a:cs typeface="+mn-cs"/>
+            </a:endParaRPr>
           </a:p>
           <a:p>
             <a:pPr marL="365760" marR="0" lvl="0" indent="-283464" algn="l" defTabSz="914400" rtl="0" eaLnBrk="1" fontAlgn="auto" latinLnBrk="0" hangingPunct="1">
@@ -4735,7 +4744,7 @@
               <a:defRPr/>
             </a:pPr>
             <a:r>
-              <a:rPr kumimoji="0" lang="en-US" sz="2800" b="0" i="0" u="none" strike="noStrike" kern="1200" cap="none" spc="0" normalizeH="0" baseline="0" noProof="0" dirty="0" err="1" smtClean="0">
+              <a:rPr kumimoji="0" lang="en-US" sz="2800" b="0" i="0" strike="noStrike" kern="1200" cap="none" spc="0" normalizeH="0" baseline="0" noProof="0" dirty="0" err="1" smtClean="0">
                 <a:ln>
                   <a:noFill/>
                 </a:ln>
@@ -4766,7 +4775,75 @@
                 <a:ea typeface="+mn-ea"/>
                 <a:cs typeface="+mn-cs"/>
               </a:rPr>
-              <a:t> – Open programming language that can make use of multiple CPUs (on the same node) and a GPU. Can combine with MPI for multiple nodes.</a:t>
+              <a:t> – Open programming language for multiple CPUs (on</a:t>
+            </a:r>
+            <a:r>
+              <a:rPr kumimoji="0" lang="en-US" sz="2800" b="0" i="0" u="none" strike="noStrike" kern="1200" cap="none" spc="0" normalizeH="0" noProof="0" dirty="0" smtClean="0">
+                <a:ln>
+                  <a:noFill/>
+                </a:ln>
+                <a:solidFill>
+                  <a:schemeClr val="tx1"/>
+                </a:solidFill>
+                <a:effectLst/>
+                <a:uLnTx/>
+                <a:uFillTx/>
+                <a:latin typeface="+mn-lt"/>
+                <a:ea typeface="+mn-ea"/>
+                <a:cs typeface="+mn-cs"/>
+              </a:rPr>
+              <a:t> </a:t>
+            </a:r>
+            <a:r>
+              <a:rPr kumimoji="0" lang="en-US" sz="2800" b="0" i="0" u="none" strike="noStrike" kern="1200" cap="none" spc="0" normalizeH="0" baseline="0" noProof="0" dirty="0" smtClean="0">
+                <a:ln>
+                  <a:noFill/>
+                </a:ln>
+                <a:solidFill>
+                  <a:schemeClr val="tx1"/>
+                </a:solidFill>
+                <a:effectLst/>
+                <a:uLnTx/>
+                <a:uFillTx/>
+                <a:latin typeface="+mn-lt"/>
+                <a:ea typeface="+mn-ea"/>
+                <a:cs typeface="+mn-cs"/>
+              </a:rPr>
+              <a:t>same node) and</a:t>
+            </a:r>
+            <a:r>
+              <a:rPr kumimoji="0" lang="en-US" sz="2800" b="0" i="0" u="none" strike="noStrike" kern="1200" cap="none" spc="0" normalizeH="0" noProof="0" dirty="0" smtClean="0">
+                <a:ln>
+                  <a:noFill/>
+                </a:ln>
+                <a:solidFill>
+                  <a:schemeClr val="tx1"/>
+                </a:solidFill>
+                <a:effectLst/>
+                <a:uLnTx/>
+                <a:uFillTx/>
+                <a:latin typeface="+mn-lt"/>
+                <a:ea typeface="+mn-ea"/>
+                <a:cs typeface="+mn-cs"/>
+              </a:rPr>
+              <a:t> </a:t>
+            </a:r>
+            <a:r>
+              <a:rPr kumimoji="0" lang="en-US" sz="2800" b="0" i="0" u="none" strike="noStrike" kern="1200" cap="none" spc="0" normalizeH="0" baseline="0" noProof="0" dirty="0" smtClean="0">
+                <a:ln>
+                  <a:noFill/>
+                </a:ln>
+                <a:solidFill>
+                  <a:schemeClr val="tx1"/>
+                </a:solidFill>
+                <a:effectLst/>
+                <a:uLnTx/>
+                <a:uFillTx/>
+                <a:latin typeface="+mn-lt"/>
+                <a:ea typeface="+mn-ea"/>
+                <a:cs typeface="+mn-cs"/>
+              </a:rPr>
+              <a:t>GPU. </a:t>
             </a:r>
           </a:p>
           <a:p>
@@ -4790,6 +4867,23 @@
               <a:defRPr/>
             </a:pPr>
             <a:r>
+              <a:rPr kumimoji="0" lang="en-US" sz="2800" b="0" i="0" strike="noStrike" kern="1200" cap="none" spc="0" normalizeH="0" baseline="0" noProof="0" dirty="0" smtClean="0">
+                <a:ln>
+                  <a:noFill/>
+                </a:ln>
+                <a:solidFill>
+                  <a:schemeClr val="tx1"/>
+                </a:solidFill>
+                <a:effectLst/>
+                <a:uLnTx/>
+                <a:uFillTx/>
+                <a:latin typeface="+mn-lt"/>
+                <a:ea typeface="+mn-ea"/>
+                <a:cs typeface="+mn-cs"/>
+              </a:rPr>
+              <a:t>CUDA</a:t>
+            </a:r>
+            <a:r>
               <a:rPr kumimoji="0" lang="en-US" sz="2800" b="0" i="0" u="none" strike="noStrike" kern="1200" cap="none" spc="0" normalizeH="0" baseline="0" noProof="0" dirty="0" smtClean="0">
                 <a:ln>
                   <a:noFill/>
@@ -4804,7 +4898,7 @@
                 <a:ea typeface="+mn-ea"/>
                 <a:cs typeface="+mn-cs"/>
               </a:rPr>
-              <a:t>CUDA – </a:t>
+              <a:t> – </a:t>
             </a:r>
             <a:r>
               <a:rPr kumimoji="0" lang="en-US" sz="2800" b="0" i="0" u="none" strike="noStrike" kern="1200" cap="none" spc="0" normalizeH="0" baseline="0" noProof="0" dirty="0" err="1" smtClean="0">
@@ -4995,150 +5089,10 @@
           <a:lstStyle/>
           <a:p>
             <a:r>
-              <a:rPr lang="en-US">
+              <a:rPr lang="en-US" dirty="0">
                 <a:ea typeface="ＭＳ Ｐゴシック" pitchFamily="-108" charset="-128"/>
               </a:rPr>
               <a:t>GPU architecture</a:t>
-            </a:r>
-          </a:p>
-        </p:txBody>
-      </p:sp>
-      <p:sp>
-        <p:nvSpPr>
-          <p:cNvPr id="31747" name="Content Placeholder 2"/>
-          <p:cNvSpPr>
-            <a:spLocks noGrp="1"/>
-          </p:cNvSpPr>
-          <p:nvPr>
-            <p:ph idx="1"/>
-          </p:nvPr>
-        </p:nvSpPr>
-        <p:spPr/>
-        <p:txBody>
-          <a:bodyPr>
-            <a:normAutofit fontScale="70000" lnSpcReduction="20000"/>
-          </a:bodyPr>
-          <a:lstStyle/>
-          <a:p>
-            <a:r>
-              <a:rPr lang="en-US" dirty="0">
-                <a:ea typeface="ＭＳ Ｐゴシック" pitchFamily="-108" charset="-128"/>
-              </a:rPr>
-              <a:t>Global Memory</a:t>
-            </a:r>
-          </a:p>
-          <a:p>
-            <a:pPr lvl="1"/>
-            <a:r>
-              <a:rPr lang="en-US" dirty="0"/>
-              <a:t>Available to entire device</a:t>
-            </a:r>
-          </a:p>
-          <a:p>
-            <a:r>
-              <a:rPr lang="en-US" dirty="0">
-                <a:ea typeface="ＭＳ Ｐゴシック" pitchFamily="-108" charset="-128"/>
-              </a:rPr>
-              <a:t>Local Memory</a:t>
-            </a:r>
-          </a:p>
-          <a:p>
-            <a:pPr lvl="1"/>
-            <a:r>
-              <a:rPr lang="en-US" dirty="0"/>
-              <a:t>Available to the work group only</a:t>
-            </a:r>
-          </a:p>
-          <a:p>
-            <a:pPr lvl="1"/>
-            <a:r>
-              <a:rPr lang="en-US" dirty="0"/>
-              <a:t>***I think this isn’t well defined in </a:t>
-            </a:r>
-            <a:r>
-              <a:rPr lang="en-US" dirty="0" err="1"/>
-              <a:t>OpenCL</a:t>
-            </a:r>
-            <a:r>
-              <a:rPr lang="en-US" dirty="0"/>
-              <a:t> and can spill over to Global without warning</a:t>
-            </a:r>
-          </a:p>
-          <a:p>
-            <a:r>
-              <a:rPr lang="en-US" dirty="0">
-                <a:ea typeface="ＭＳ Ｐゴシック" pitchFamily="-108" charset="-128"/>
-              </a:rPr>
-              <a:t>Private Memory</a:t>
-            </a:r>
-          </a:p>
-          <a:p>
-            <a:pPr lvl="1"/>
-            <a:r>
-              <a:rPr lang="en-US" dirty="0"/>
-              <a:t>Available to work item only</a:t>
-            </a:r>
-          </a:p>
-          <a:p>
-            <a:r>
-              <a:rPr lang="en-US" dirty="0">
-                <a:ea typeface="ＭＳ Ｐゴシック" pitchFamily="-108" charset="-128"/>
-              </a:rPr>
-              <a:t>Constant Memory</a:t>
-            </a:r>
-          </a:p>
-          <a:p>
-            <a:pPr lvl="1"/>
-            <a:r>
-              <a:rPr lang="en-US" dirty="0"/>
-              <a:t>Read only, can be faster than global</a:t>
-            </a:r>
-          </a:p>
-          <a:p>
-            <a:r>
-              <a:rPr lang="en-US" dirty="0">
-                <a:ea typeface="ＭＳ Ｐゴシック" pitchFamily="-108" charset="-128"/>
-              </a:rPr>
-              <a:t>SIMD group size – efficient code is a multiple of this</a:t>
-            </a:r>
-          </a:p>
-          <a:p>
-            <a:pPr lvl="1"/>
-            <a:r>
-              <a:rPr lang="en-US" dirty="0" err="1"/>
-              <a:t>Nvidia</a:t>
-            </a:r>
-            <a:r>
-              <a:rPr lang="en-US" dirty="0"/>
-              <a:t> – Warp </a:t>
-            </a:r>
-            <a:r>
-              <a:rPr lang="en-US" dirty="0" smtClean="0"/>
-              <a:t>= 32 cores</a:t>
-            </a:r>
-            <a:endParaRPr lang="en-US" dirty="0"/>
-          </a:p>
-          <a:p>
-            <a:pPr lvl="1"/>
-            <a:r>
-              <a:rPr lang="en-US" dirty="0"/>
-              <a:t>ATI – </a:t>
-            </a:r>
-            <a:r>
-              <a:rPr lang="en-US" dirty="0" err="1" smtClean="0"/>
-              <a:t>Wavefront</a:t>
-            </a:r>
-            <a:r>
-              <a:rPr lang="en-US" dirty="0" smtClean="0"/>
-              <a:t> = 64 cores</a:t>
-            </a:r>
-            <a:endParaRPr lang="en-US" dirty="0"/>
-          </a:p>
-          <a:p>
-            <a:pPr lvl="1"/>
-            <a:r>
-              <a:rPr lang="en-US" dirty="0"/>
-              <a:t>http://stackoverflow.com/questions/7093488/opencl-how-to-i-query-for-a-devices-simd-width</a:t>
             </a:r>
           </a:p>
         </p:txBody>
@@ -5170,6 +5124,66 @@
               <a:t>2</a:t>
             </a:fld>
             <a:endParaRPr lang="en-US"/>
+          </a:p>
+        </p:txBody>
+      </p:sp>
+      <p:pic>
+        <p:nvPicPr>
+          <p:cNvPr id="1026" name="Picture 2" descr="http://www.realworldtech.com/includes/images/articles/g100-2.gif"/>
+          <p:cNvPicPr>
+            <a:picLocks noChangeAspect="1" noChangeArrowheads="1"/>
+          </p:cNvPicPr>
+          <p:nvPr/>
+        </p:nvPicPr>
+        <p:blipFill>
+          <a:blip r:embed="rId2"/>
+          <a:srcRect/>
+          <a:stretch>
+            <a:fillRect/>
+          </a:stretch>
+        </p:blipFill>
+        <p:spPr bwMode="auto">
+          <a:xfrm>
+            <a:off x="2362200" y="1417637"/>
+            <a:ext cx="4191000" cy="4639779"/>
+          </a:xfrm>
+          <a:prstGeom prst="rect">
+            <a:avLst/>
+          </a:prstGeom>
+          <a:noFill/>
+        </p:spPr>
+      </p:pic>
+      <p:sp>
+        <p:nvSpPr>
+          <p:cNvPr id="6" name="TextBox 5"/>
+          <p:cNvSpPr txBox="1"/>
+          <p:nvPr/>
+        </p:nvSpPr>
+        <p:spPr>
+          <a:xfrm>
+            <a:off x="3273552" y="6031468"/>
+            <a:ext cx="3127248" cy="369332"/>
+          </a:xfrm>
+          <a:prstGeom prst="rect">
+            <a:avLst/>
+          </a:prstGeom>
+          <a:noFill/>
+        </p:spPr>
+        <p:txBody>
+          <a:bodyPr wrap="square" rtlCol="0">
+            <a:spAutoFit/>
+          </a:bodyPr>
+          <a:lstStyle/>
+          <a:p>
+            <a:r>
+              <a:rPr lang="en-US" sz="1400" dirty="0" smtClean="0"/>
+              <a:t>http://www.realworldtech.com/gt200/3</a:t>
+            </a:r>
+            <a:r>
+              <a:rPr lang="en-US" dirty="0" smtClean="0"/>
+              <a:t>/</a:t>
+            </a:r>
+            <a:endParaRPr lang="en-US" dirty="0"/>
           </a:p>
         </p:txBody>
       </p:sp>

</xml_diff>